<commit_message>
Added under development notice and updated logo
</commit_message>
<xml_diff>
--- a/images/nwb-extensions-catalog-logo.pptx
+++ b/images/nwb-extensions-catalog-logo.pptx
@@ -8,7 +8,7 @@
     <p:notesMasterId r:id="rId5"/>
   </p:notesMasterIdLst>
   <p:sldIdLst>
-    <p:sldId id="258" r:id="rId2"/>
+    <p:sldId id="261" r:id="rId2"/>
     <p:sldId id="260" r:id="rId3"/>
     <p:sldId id="259" r:id="rId4"/>
   </p:sldIdLst>
@@ -3687,8 +3687,8 @@
         </p:blipFill>
         <p:spPr>
           <a:xfrm>
-            <a:off x="2348613" y="1382287"/>
-            <a:ext cx="4135624" cy="535621"/>
+            <a:off x="2479549" y="4571634"/>
+            <a:ext cx="3765713" cy="487712"/>
           </a:xfrm>
           <a:prstGeom prst="rect">
             <a:avLst/>
@@ -3703,7 +3703,7 @@
         </p:nvGrpSpPr>
         <p:grpSpPr>
           <a:xfrm>
-            <a:off x="2449184" y="2154425"/>
+            <a:off x="2331956" y="759860"/>
             <a:ext cx="3513666" cy="3490022"/>
             <a:chOff x="2229557" y="2154425"/>
             <a:chExt cx="3513666" cy="3490022"/>
@@ -6355,7 +6355,7 @@
     </p:spTree>
     <p:extLst>
       <p:ext uri="{BB962C8B-B14F-4D97-AF65-F5344CB8AC3E}">
-        <p14:creationId xmlns:p14="http://schemas.microsoft.com/office/powerpoint/2010/main" val="978007361"/>
+        <p14:creationId xmlns:p14="http://schemas.microsoft.com/office/powerpoint/2010/main" val="691200680"/>
       </p:ext>
     </p:extLst>
   </p:cSld>

</xml_diff>